<commit_message>
feat: Update default presentation layout to 'LAYOUT_WIDE' and improve XML generation comments
</commit_message>
<xml_diff>
--- a/CustomLayout_Test.pptx
+++ b/CustomLayout_Test.pptx
@@ -1,43 +1,21 @@
 
 <file path=ppt/presentation.xml><?xml version="1.0" encoding="utf-8"?>
-<p:presentation xmlns:a="http://schemas.openxmlformats.org/drawingml/2006/main" xmlns:r="http://schemas.openxmlformats.org/officeDocument/2006/relationships" xmlns:p="http://schemas.openxmlformats.org/presentationml/2006/main" saveSubsetFonts="1">
+<p:presentation xmlns:a="http://schemas.openxmlformats.org/drawingml/2006/main" xmlns:r="http://schemas.openxmlformats.org/officeDocument/2006/relationships" xmlns:p="http://schemas.openxmlformats.org/presentationml/2006/main" saveSubsetFonts="1" autoCompressPictures="0">
   <p:sldMasterIdLst>
-    <p:sldMasterId id="2147483660" r:id="rId4"/>
+    <p:sldMasterId id="2147483648" r:id="rId1"/>
   </p:sldMasterIdLst>
+  <p:sldIdLst>
+    <p:sldId id="256" r:id="rId2"/>
+    <p:sldId id="257" r:id="rId3"/>
+    <p:sldId id="258" r:id="rId4"/>
+  </p:sldIdLst>
   <p:notesMasterIdLst>
-    <p:notesMasterId r:id="rId24"/>
+    <p:notesMasterId r:id="rId5"/>
   </p:notesMasterIdLst>
-  <p:handoutMasterIdLst>
-    <p:handoutMasterId r:id="rId25"/>
-  </p:handoutMasterIdLst>
-  <p:sldIdLst>
-    <p:sldId id="256" r:id="rId5"/>
-    <p:sldId id="477" r:id="rId6"/>
-    <p:sldId id="478" r:id="rId7"/>
-    <p:sldId id="468" r:id="rId8"/>
-    <p:sldId id="530" r:id="rId9"/>
-    <p:sldId id="531" r:id="rId10"/>
-    <p:sldId id="532" r:id="rId11"/>
-    <p:sldId id="284" r:id="rId12"/>
-    <p:sldId id="326" r:id="rId13"/>
-    <p:sldId id="466" r:id="rId14"/>
-    <p:sldId id="533" r:id="rId15"/>
-    <p:sldId id="505" r:id="rId16"/>
-    <p:sldId id="506" r:id="rId17"/>
-    <p:sldId id="507" r:id="rId18"/>
-    <p:sldId id="527" r:id="rId19"/>
-    <p:sldId id="528" r:id="rId20"/>
-    <p:sldId id="529" r:id="rId21"/>
-    <p:sldId id="534" r:id="rId22"/>
-    <p:sldId id="481" r:id="rId23"/>
-  </p:sldIdLst>
   <p:sldSz cx="12192000" cy="6858000"/>
-  <p:notesSz cx="7102475" cy="9388475"/>
+  <p:notesSz cx="6858000" cy="12192000"/>
   <p:defaultTextStyle>
-    <a:defPPr>
-      <a:defRPr lang="en-US"/>
-    </a:defPPr>
-    <a:lvl1pPr marL="0" algn="l" defTabSz="457200" rtl="0" eaLnBrk="1" latinLnBrk="0" hangingPunct="1">
+    <a:lvl1pPr marL="0" algn="l" defTabSz="914400" rtl="0" eaLnBrk="1" latinLnBrk="0" hangingPunct="1">
       <a:defRPr sz="1800" kern="1200">
         <a:solidFill>
           <a:schemeClr val="tx1"/>
@@ -47,7 +25,7 @@
         <a:cs typeface="+mn-cs"/>
       </a:defRPr>
     </a:lvl1pPr>
-    <a:lvl2pPr marL="457200" algn="l" defTabSz="457200" rtl="0" eaLnBrk="1" latinLnBrk="0" hangingPunct="1">
+    <a:lvl2pPr marL="457200" algn="l" defTabSz="914400" rtl="0" eaLnBrk="1" latinLnBrk="0" hangingPunct="1">
       <a:defRPr sz="1800" kern="1200">
         <a:solidFill>
           <a:schemeClr val="tx1"/>
@@ -57,7 +35,7 @@
         <a:cs typeface="+mn-cs"/>
       </a:defRPr>
     </a:lvl2pPr>
-    <a:lvl3pPr marL="914400" algn="l" defTabSz="457200" rtl="0" eaLnBrk="1" latinLnBrk="0" hangingPunct="1">
+    <a:lvl3pPr marL="914400" algn="l" defTabSz="914400" rtl="0" eaLnBrk="1" latinLnBrk="0" hangingPunct="1">
       <a:defRPr sz="1800" kern="1200">
         <a:solidFill>
           <a:schemeClr val="tx1"/>
@@ -67,7 +45,7 @@
         <a:cs typeface="+mn-cs"/>
       </a:defRPr>
     </a:lvl3pPr>
-    <a:lvl4pPr marL="1371600" algn="l" defTabSz="457200" rtl="0" eaLnBrk="1" latinLnBrk="0" hangingPunct="1">
+    <a:lvl4pPr marL="1371600" algn="l" defTabSz="914400" rtl="0" eaLnBrk="1" latinLnBrk="0" hangingPunct="1">
       <a:defRPr sz="1800" kern="1200">
         <a:solidFill>
           <a:schemeClr val="tx1"/>
@@ -77,7 +55,7 @@
         <a:cs typeface="+mn-cs"/>
       </a:defRPr>
     </a:lvl4pPr>
-    <a:lvl5pPr marL="1828800" algn="l" defTabSz="457200" rtl="0" eaLnBrk="1" latinLnBrk="0" hangingPunct="1">
+    <a:lvl5pPr marL="1828800" algn="l" defTabSz="914400" rtl="0" eaLnBrk="1" latinLnBrk="0" hangingPunct="1">
       <a:defRPr sz="1800" kern="1200">
         <a:solidFill>
           <a:schemeClr val="tx1"/>
@@ -87,7 +65,7 @@
         <a:cs typeface="+mn-cs"/>
       </a:defRPr>
     </a:lvl5pPr>
-    <a:lvl6pPr marL="2286000" algn="l" defTabSz="457200" rtl="0" eaLnBrk="1" latinLnBrk="0" hangingPunct="1">
+    <a:lvl6pPr marL="2286000" algn="l" defTabSz="914400" rtl="0" eaLnBrk="1" latinLnBrk="0" hangingPunct="1">
       <a:defRPr sz="1800" kern="1200">
         <a:solidFill>
           <a:schemeClr val="tx1"/>
@@ -97,7 +75,7 @@
         <a:cs typeface="+mn-cs"/>
       </a:defRPr>
     </a:lvl6pPr>
-    <a:lvl7pPr marL="2743200" algn="l" defTabSz="457200" rtl="0" eaLnBrk="1" latinLnBrk="0" hangingPunct="1">
+    <a:lvl7pPr marL="2743200" algn="l" defTabSz="914400" rtl="0" eaLnBrk="1" latinLnBrk="0" hangingPunct="1">
       <a:defRPr sz="1800" kern="1200">
         <a:solidFill>
           <a:schemeClr val="tx1"/>
@@ -107,7 +85,7 @@
         <a:cs typeface="+mn-cs"/>
       </a:defRPr>
     </a:lvl7pPr>
-    <a:lvl8pPr marL="3200400" algn="l" defTabSz="457200" rtl="0" eaLnBrk="1" latinLnBrk="0" hangingPunct="1">
+    <a:lvl8pPr marL="3200400" algn="l" defTabSz="914400" rtl="0" eaLnBrk="1" latinLnBrk="0" hangingPunct="1">
       <a:defRPr sz="1800" kern="1200">
         <a:solidFill>
           <a:schemeClr val="tx1"/>
@@ -117,7 +95,7 @@
         <a:cs typeface="+mn-cs"/>
       </a:defRPr>
     </a:lvl8pPr>
-    <a:lvl9pPr marL="3657600" algn="l" defTabSz="457200" rtl="0" eaLnBrk="1" latinLnBrk="0" hangingPunct="1">
+    <a:lvl9pPr marL="3657600" algn="l" defTabSz="914400" rtl="0" eaLnBrk="1" latinLnBrk="0" hangingPunct="1">
       <a:defRPr sz="1800" kern="1200">
         <a:solidFill>
           <a:schemeClr val="tx1"/>
@@ -128,52 +106,6 @@
       </a:defRPr>
     </a:lvl9pPr>
   </p:defaultTextStyle>
-  <p:extLst>
-    <p:ext uri="{521415D9-36F7-43E2-AB2F-B90AF26B5E84}">
-      <p14:sectionLst xmlns:p14="http://schemas.microsoft.com/office/powerpoint/2010/main">
-        <p14:section name="Default Section" id="{DC4731B1-26E5-43D4-8CB9-A8BE58ED976F}">
-          <p14:sldIdLst>
-            <p14:sldId id="256"/>
-            <p14:sldId id="477"/>
-            <p14:sldId id="478"/>
-            <p14:sldId id="468"/>
-            <p14:sldId id="530"/>
-            <p14:sldId id="531"/>
-            <p14:sldId id="532"/>
-            <p14:sldId id="284"/>
-            <p14:sldId id="326"/>
-            <p14:sldId id="466"/>
-            <p14:sldId id="533"/>
-            <p14:sldId id="505"/>
-            <p14:sldId id="506"/>
-            <p14:sldId id="507"/>
-            <p14:sldId id="527"/>
-            <p14:sldId id="528"/>
-            <p14:sldId id="529"/>
-            <p14:sldId id="534"/>
-            <p14:sldId id="481"/>
-          </p14:sldIdLst>
-        </p14:section>
-      </p14:sectionLst>
-    </p:ext>
-    <p:ext uri="{EFAFB233-063F-42B5-8137-9DF3F51BA10A}">
-      <p15:sldGuideLst xmlns:p15="http://schemas.microsoft.com/office/powerpoint/2012/main">
-        <p15:guide id="1" orient="horz" pos="2160" userDrawn="1">
-          <p15:clr>
-            <a:srgbClr val="A4A3A4"/>
-          </p15:clr>
-        </p15:guide>
-        <p15:guide id="2" pos="3840" userDrawn="1">
-          <p15:clr>
-            <a:srgbClr val="A4A3A4"/>
-          </p15:clr>
-        </p15:guide>
-      </p15:sldGuideLst>
-    </p:ext>
-    <p:ext uri="{2D200454-40CA-4A62-9FC3-DE9A4176ACB9}">
-      <p15:notesGuideLst xmlns:p15="http://schemas.microsoft.com/office/powerpoint/2012/main"/>
-    </p:ext>
-  </p:extLst>
 </p:presentation>
 </file>
 
@@ -1330,63 +1262,7 @@
   </p:cSld>
   <p:clrMap bg1="lt1" tx1="dk1" bg2="lt2" tx2="dk2" accent1="accent1" accent2="accent2" accent3="accent3" accent4="accent4" accent5="accent5" accent6="accent6" hlink="hlink" folHlink="folHlink"/>
   <p:sldLayoutIdLst>
-    <p:sldLayoutId id="2147483757" r:id="rId1"/>
-    <p:sldLayoutId id="2147483758" r:id="rId2"/>
-    <p:sldLayoutId id="2147483767" r:id="rId3"/>
-    <p:sldLayoutId id="2147483664" r:id="rId4"/>
-    <p:sldLayoutId id="2147483704" r:id="rId5"/>
-    <p:sldLayoutId id="2147483768" r:id="rId6"/>
-    <p:sldLayoutId id="2147483769" r:id="rId7"/>
-    <p:sldLayoutId id="2147483668" r:id="rId8"/>
-    <p:sldLayoutId id="2147483759" r:id="rId9"/>
-    <p:sldLayoutId id="2147483667" r:id="rId10"/>
-    <p:sldLayoutId id="2147483742" r:id="rId11"/>
-    <p:sldLayoutId id="2147483727" r:id="rId12"/>
-    <p:sldLayoutId id="2147483771" r:id="rId13"/>
-    <p:sldLayoutId id="2147483772" r:id="rId14"/>
-    <p:sldLayoutId id="2147483711" r:id="rId15"/>
-    <p:sldLayoutId id="2147483698" r:id="rId16"/>
-    <p:sldLayoutId id="2147483700" r:id="rId17"/>
-    <p:sldLayoutId id="2147483702" r:id="rId18"/>
-    <p:sldLayoutId id="2147483774" r:id="rId19"/>
-    <p:sldLayoutId id="2147483826" r:id="rId20"/>
-    <p:sldLayoutId id="2147483773" r:id="rId21"/>
-    <p:sldLayoutId id="2147483707" r:id="rId22"/>
-    <p:sldLayoutId id="2147483741" r:id="rId23"/>
-    <p:sldLayoutId id="2147483814" r:id="rId24"/>
-    <p:sldLayoutId id="2147483815" r:id="rId25"/>
-    <p:sldLayoutId id="2147483816" r:id="rId26"/>
-    <p:sldLayoutId id="2147483680" r:id="rId27"/>
-    <p:sldLayoutId id="2147483735" r:id="rId28"/>
-    <p:sldLayoutId id="2147483678" r:id="rId29"/>
-    <p:sldLayoutId id="2147483734" r:id="rId30"/>
-    <p:sldLayoutId id="2147483675" r:id="rId31"/>
-    <p:sldLayoutId id="2147483663" r:id="rId32"/>
-    <p:sldLayoutId id="2147483762" r:id="rId33"/>
-    <p:sldLayoutId id="2147483817" r:id="rId34"/>
-    <p:sldLayoutId id="2147483818" r:id="rId35"/>
-    <p:sldLayoutId id="2147483805" r:id="rId36"/>
-    <p:sldLayoutId id="2147483806" r:id="rId37"/>
-    <p:sldLayoutId id="2147483809" r:id="rId38"/>
-    <p:sldLayoutId id="2147483807" r:id="rId39"/>
-    <p:sldLayoutId id="2147483810" r:id="rId40"/>
-    <p:sldLayoutId id="2147483813" r:id="rId41"/>
-    <p:sldLayoutId id="2147483688" r:id="rId42"/>
-    <p:sldLayoutId id="2147483778" r:id="rId43"/>
-    <p:sldLayoutId id="2147483822" r:id="rId44"/>
-    <p:sldLayoutId id="2147483779" r:id="rId45"/>
-    <p:sldLayoutId id="2147483825" r:id="rId46"/>
-    <p:sldLayoutId id="2147483821" r:id="rId47"/>
-    <p:sldLayoutId id="2147483820" r:id="rId48"/>
-    <p:sldLayoutId id="2147483781" r:id="rId49"/>
-    <p:sldLayoutId id="2147483782" r:id="rId50"/>
-    <p:sldLayoutId id="2147483783" r:id="rId51"/>
-    <p:sldLayoutId id="2147483786" r:id="rId52"/>
-    <p:sldLayoutId id="2147483784" r:id="rId53"/>
-    <p:sldLayoutId id="2147483819" r:id="rId54"/>
-    <p:sldLayoutId id="2147483824" r:id="rId55"/>
-    <p:sldLayoutId id="2147483827" r:id="rId56"/>
-    <p:sldLayoutId id="2147483674" r:id="rId57"/>
+    <p:sldLayoutId id="2147483001" r:id="rId1"/>
   </p:sldLayoutIdLst>
   <p:hf hdr="0" ftr="0" dt="0"/>
   <p:txStyles>

</xml_diff>